<commit_message>
Updated the presentation with a new definition for the project
</commit_message>
<xml_diff>
--- a/Documentation/Bug-Z_Overview.pptx
+++ b/Documentation/Bug-Z_Overview.pptx
@@ -1510,7 +1510,7 @@
           <a:p>
             <a:fld id="{0DD51EFA-6533-45C3-8394-23FFC04F750D}" type="datetimeFigureOut">
               <a:rPr lang="en-US" smtClean="0"/>
-              <a:t>6/25/2020</a:t>
+              <a:t>6/26/2020</a:t>
             </a:fld>
             <a:endParaRPr lang="en-US" dirty="0"/>
           </a:p>
@@ -1687,7 +1687,7 @@
           <a:p>
             <a:fld id="{B7B4C180-10CF-422C-B717-65F1B78C7EB7}" type="datetimeFigureOut">
               <a:rPr lang="en-US" noProof="0" smtClean="0"/>
-              <a:t>6/25/2020</a:t>
+              <a:t>6/26/2020</a:t>
             </a:fld>
             <a:endParaRPr lang="en-US" noProof="0" dirty="0"/>
           </a:p>
@@ -35374,7 +35374,7 @@
                   </a:schemeClr>
                 </a:solidFill>
               </a:rPr>
-              <a:t>Simulate</a:t>
+              <a:t>Emulate</a:t>
             </a:r>
           </a:p>
         </p:txBody>
@@ -35452,8 +35452,12 @@
           <a:lstStyle/>
           <a:p>
             <a:r>
+              <a:rPr lang="en-US"/>
+              <a:t>Emulate </a:t>
+            </a:r>
+            <a:r>
               <a:rPr lang="en-US" dirty="0"/>
-              <a:t>Simulate sensors, actuators and any signals necessary before full system completion to prevent delays.</a:t>
+              <a:t>sensors, actuators and any signals necessary before full system completion to prevent delays.</a:t>
             </a:r>
           </a:p>
         </p:txBody>
@@ -43363,20 +43367,20 @@
 </file>
 
 <file path=customXml/item2.xml><?xml version="1.0" encoding="utf-8"?>
+<p:properties xmlns:p="http://schemas.microsoft.com/office/2006/metadata/properties" xmlns:xsi="http://www.w3.org/2001/XMLSchema-instance" xmlns:pc="http://schemas.microsoft.com/office/infopath/2007/PartnerControls">
+  <documentManagement>
+    <MediaServiceKeyPoints xmlns="71af3243-3dd4-4a8d-8c0d-dd76da1f02a5" xsi:nil="true"/>
+  </documentManagement>
+</p:properties>
+</file>
+
+<file path=customXml/item3.xml><?xml version="1.0" encoding="utf-8"?>
 <?mso-contentType ?>
 <FormTemplates xmlns="http://schemas.microsoft.com/sharepoint/v3/contenttype/forms">
   <Display>DocumentLibraryForm</Display>
   <Edit>DocumentLibraryForm</Edit>
   <New>DocumentLibraryForm</New>
 </FormTemplates>
-</file>
-
-<file path=customXml/item3.xml><?xml version="1.0" encoding="utf-8"?>
-<p:properties xmlns:p="http://schemas.microsoft.com/office/2006/metadata/properties" xmlns:xsi="http://www.w3.org/2001/XMLSchema-instance" xmlns:pc="http://schemas.microsoft.com/office/infopath/2007/PartnerControls">
-  <documentManagement>
-    <MediaServiceKeyPoints xmlns="71af3243-3dd4-4a8d-8c0d-dd76da1f02a5" xsi:nil="true"/>
-  </documentManagement>
-</p:properties>
 </file>
 
 <file path=customXml/itemProps1.xml><?xml version="1.0" encoding="utf-8"?>
@@ -43399,14 +43403,6 @@
 </file>
 
 <file path=customXml/itemProps2.xml><?xml version="1.0" encoding="utf-8"?>
-<ds:datastoreItem xmlns:ds="http://schemas.openxmlformats.org/officeDocument/2006/customXml" ds:itemID="{56E3E58C-5E8A-4781-9921-C2B23BC09EB2}">
-  <ds:schemaRefs>
-    <ds:schemaRef ds:uri="http://schemas.microsoft.com/sharepoint/v3/contenttype/forms"/>
-  </ds:schemaRefs>
-</ds:datastoreItem>
-</file>
-
-<file path=customXml/itemProps3.xml><?xml version="1.0" encoding="utf-8"?>
 <ds:datastoreItem xmlns:ds="http://schemas.openxmlformats.org/officeDocument/2006/customXml" ds:itemID="{C9C0BFDF-D948-4F4A-854E-477525F57792}">
   <ds:schemaRefs>
     <ds:schemaRef ds:uri="16c05727-aa75-4e4a-9b5f-8a80a1165891"/>
@@ -43421,4 +43417,12 @@
     <ds:schemaRef ds:uri="http://www.w3.org/XML/1998/namespace"/>
   </ds:schemaRefs>
 </ds:datastoreItem>
+</file>
+
+<file path=customXml/itemProps3.xml><?xml version="1.0" encoding="utf-8"?>
+<ds:datastoreItem xmlns:ds="http://schemas.openxmlformats.org/officeDocument/2006/customXml" ds:itemID="{56E3E58C-5E8A-4781-9921-C2B23BC09EB2}">
+  <ds:schemaRefs>
+    <ds:schemaRef ds:uri="http://schemas.microsoft.com/sharepoint/v3/contenttype/forms"/>
+  </ds:schemaRefs>
+</ds:datastoreItem>
 </file>
</xml_diff>